<commit_message>
Cross your fingers, last PP push
</commit_message>
<xml_diff>
--- a/Overview PP.pptx
+++ b/Overview PP.pptx
@@ -23,7 +23,7 @@
     <p:sldId id="280" r:id="rId14"/>
     <p:sldId id="264" r:id="rId15"/>
     <p:sldId id="265" r:id="rId16"/>
-    <p:sldId id="282" r:id="rId17"/>
+    <p:sldId id="283" r:id="rId17"/>
     <p:sldId id="267" r:id="rId18"/>
     <p:sldId id="269" r:id="rId19"/>
     <p:sldId id="276" r:id="rId20"/>
@@ -527,7 +527,10 @@
           <a:bodyPr/>
           <a:lstStyle/>
           <a:p>
-            <a:endParaRPr lang="en-US" dirty="0"/>
+            <a:r>
+              <a:rPr lang="en-US" dirty="0"/>
+              <a:t>Definition of Craft Brewer --- A brewer that has a majority of its total beverage alcohol volume in beers whose flavors derive from traditional or innovative brewing ingredients and their fermentation. Usually small volume</a:t>
+            </a:r>
           </a:p>
         </p:txBody>
       </p:sp>
@@ -611,10 +614,7 @@
           <a:bodyPr/>
           <a:lstStyle/>
           <a:p>
-            <a:r>
-              <a:rPr lang="en-US" dirty="0"/>
-              <a:t>Ball’s Brewery (Hopslam)</a:t>
-            </a:r>
+            <a:endParaRPr lang="en-US" dirty="0"/>
           </a:p>
         </p:txBody>
       </p:sp>
@@ -635,7 +635,7 @@
           <a:p>
             <a:fld id="{DD17A8D9-0DD1-40AC-9104-F27D923DAB7C}" type="slidenum">
               <a:rPr lang="en-US" smtClean="0"/>
-              <a:t>15</a:t>
+              <a:t>12</a:t>
             </a:fld>
             <a:endParaRPr lang="en-US"/>
           </a:p>
@@ -644,7 +644,7 @@
     </p:spTree>
     <p:extLst>
       <p:ext uri="{BB962C8B-B14F-4D97-AF65-F5344CB8AC3E}">
-        <p14:creationId xmlns:p14="http://schemas.microsoft.com/office/powerpoint/2010/main" val="228716277"/>
+        <p14:creationId xmlns:p14="http://schemas.microsoft.com/office/powerpoint/2010/main" val="2650424675"/>
       </p:ext>
     </p:extLst>
   </p:cSld>
@@ -700,6 +700,180 @@
           <a:p>
             <a:r>
               <a:rPr lang="en-US" dirty="0"/>
+              <a:t>Huge area to be used for distribution/brick and mortar locations in Harris County (North of Houston)</a:t>
+            </a:r>
+          </a:p>
+        </p:txBody>
+      </p:sp>
+      <p:sp>
+        <p:nvSpPr>
+          <p:cNvPr id="4" name="Slide Number Placeholder 3"/>
+          <p:cNvSpPr>
+            <a:spLocks noGrp="1"/>
+          </p:cNvSpPr>
+          <p:nvPr>
+            <p:ph type="sldNum" sz="quarter" idx="10"/>
+          </p:nvPr>
+        </p:nvSpPr>
+        <p:spPr/>
+        <p:txBody>
+          <a:bodyPr/>
+          <a:lstStyle/>
+          <a:p>
+            <a:fld id="{DD17A8D9-0DD1-40AC-9104-F27D923DAB7C}" type="slidenum">
+              <a:rPr lang="en-US" smtClean="0"/>
+              <a:t>13</a:t>
+            </a:fld>
+            <a:endParaRPr lang="en-US"/>
+          </a:p>
+        </p:txBody>
+      </p:sp>
+    </p:spTree>
+    <p:extLst>
+      <p:ext uri="{BB962C8B-B14F-4D97-AF65-F5344CB8AC3E}">
+        <p14:creationId xmlns:p14="http://schemas.microsoft.com/office/powerpoint/2010/main" val="809993758"/>
+      </p:ext>
+    </p:extLst>
+  </p:cSld>
+  <p:clrMapOvr>
+    <a:masterClrMapping/>
+  </p:clrMapOvr>
+</p:notes>
+</file>
+
+<file path=ppt/notesSlides/notesSlide12.xml><?xml version="1.0" encoding="utf-8"?>
+<p:notes xmlns:a="http://schemas.openxmlformats.org/drawingml/2006/main" xmlns:r="http://schemas.openxmlformats.org/officeDocument/2006/relationships" xmlns:p="http://schemas.openxmlformats.org/presentationml/2006/main">
+  <p:cSld>
+    <p:spTree>
+      <p:nvGrpSpPr>
+        <p:cNvPr id="1" name=""/>
+        <p:cNvGrpSpPr/>
+        <p:nvPr/>
+      </p:nvGrpSpPr>
+      <p:grpSpPr>
+        <a:xfrm>
+          <a:off x="0" y="0"/>
+          <a:ext cx="0" cy="0"/>
+          <a:chOff x="0" y="0"/>
+          <a:chExt cx="0" cy="0"/>
+        </a:xfrm>
+      </p:grpSpPr>
+      <p:sp>
+        <p:nvSpPr>
+          <p:cNvPr id="2" name="Slide Image Placeholder 1"/>
+          <p:cNvSpPr>
+            <a:spLocks noGrp="1" noRot="1" noChangeAspect="1"/>
+          </p:cNvSpPr>
+          <p:nvPr>
+            <p:ph type="sldImg"/>
+          </p:nvPr>
+        </p:nvSpPr>
+        <p:spPr/>
+      </p:sp>
+      <p:sp>
+        <p:nvSpPr>
+          <p:cNvPr id="3" name="Notes Placeholder 2"/>
+          <p:cNvSpPr>
+            <a:spLocks noGrp="1"/>
+          </p:cNvSpPr>
+          <p:nvPr>
+            <p:ph type="body" idx="1"/>
+          </p:nvPr>
+        </p:nvSpPr>
+        <p:spPr/>
+        <p:txBody>
+          <a:bodyPr/>
+          <a:lstStyle/>
+          <a:p>
+            <a:r>
+              <a:rPr lang="en-US" dirty="0"/>
+              <a:t>Ball’s Brewery (Hopslam)</a:t>
+            </a:r>
+          </a:p>
+        </p:txBody>
+      </p:sp>
+      <p:sp>
+        <p:nvSpPr>
+          <p:cNvPr id="4" name="Slide Number Placeholder 3"/>
+          <p:cNvSpPr>
+            <a:spLocks noGrp="1"/>
+          </p:cNvSpPr>
+          <p:nvPr>
+            <p:ph type="sldNum" sz="quarter" idx="10"/>
+          </p:nvPr>
+        </p:nvSpPr>
+        <p:spPr/>
+        <p:txBody>
+          <a:bodyPr/>
+          <a:lstStyle/>
+          <a:p>
+            <a:fld id="{DD17A8D9-0DD1-40AC-9104-F27D923DAB7C}" type="slidenum">
+              <a:rPr lang="en-US" smtClean="0"/>
+              <a:t>15</a:t>
+            </a:fld>
+            <a:endParaRPr lang="en-US"/>
+          </a:p>
+        </p:txBody>
+      </p:sp>
+    </p:spTree>
+    <p:extLst>
+      <p:ext uri="{BB962C8B-B14F-4D97-AF65-F5344CB8AC3E}">
+        <p14:creationId xmlns:p14="http://schemas.microsoft.com/office/powerpoint/2010/main" val="228716277"/>
+      </p:ext>
+    </p:extLst>
+  </p:cSld>
+  <p:clrMapOvr>
+    <a:masterClrMapping/>
+  </p:clrMapOvr>
+</p:notes>
+</file>
+
+<file path=ppt/notesSlides/notesSlide13.xml><?xml version="1.0" encoding="utf-8"?>
+<p:notes xmlns:a="http://schemas.openxmlformats.org/drawingml/2006/main" xmlns:r="http://schemas.openxmlformats.org/officeDocument/2006/relationships" xmlns:p="http://schemas.openxmlformats.org/presentationml/2006/main">
+  <p:cSld>
+    <p:spTree>
+      <p:nvGrpSpPr>
+        <p:cNvPr id="1" name=""/>
+        <p:cNvGrpSpPr/>
+        <p:nvPr/>
+      </p:nvGrpSpPr>
+      <p:grpSpPr>
+        <a:xfrm>
+          <a:off x="0" y="0"/>
+          <a:ext cx="0" cy="0"/>
+          <a:chOff x="0" y="0"/>
+          <a:chExt cx="0" cy="0"/>
+        </a:xfrm>
+      </p:grpSpPr>
+      <p:sp>
+        <p:nvSpPr>
+          <p:cNvPr id="2" name="Slide Image Placeholder 1"/>
+          <p:cNvSpPr>
+            <a:spLocks noGrp="1" noRot="1" noChangeAspect="1"/>
+          </p:cNvSpPr>
+          <p:nvPr>
+            <p:ph type="sldImg"/>
+          </p:nvPr>
+        </p:nvSpPr>
+        <p:spPr/>
+      </p:sp>
+      <p:sp>
+        <p:nvSpPr>
+          <p:cNvPr id="3" name="Notes Placeholder 2"/>
+          <p:cNvSpPr>
+            <a:spLocks noGrp="1"/>
+          </p:cNvSpPr>
+          <p:nvPr>
+            <p:ph type="body" idx="1"/>
+          </p:nvPr>
+        </p:nvSpPr>
+        <p:spPr/>
+        <p:txBody>
+          <a:bodyPr/>
+          <a:lstStyle/>
+          <a:p>
+            <a:r>
+              <a:rPr lang="en-US" dirty="0"/>
               <a:t>https://www.brewersassociation.org/insights/shifting-demographics-among-craft-drinkers/</a:t>
             </a:r>
           </a:p>
@@ -741,7 +915,7 @@
 </p:notes>
 </file>
 
-<file path=ppt/notesSlides/notesSlide12.xml><?xml version="1.0" encoding="utf-8"?>
+<file path=ppt/notesSlides/notesSlide14.xml><?xml version="1.0" encoding="utf-8"?>
 <p:notes xmlns:a="http://schemas.openxmlformats.org/drawingml/2006/main" xmlns:r="http://schemas.openxmlformats.org/officeDocument/2006/relationships" xmlns:p="http://schemas.openxmlformats.org/presentationml/2006/main">
   <p:cSld>
     <p:spTree>
@@ -993,7 +1167,7 @@
           <a:p>
             <a:r>
               <a:rPr lang="en-US" dirty="0"/>
-              <a:t>Population is constantly shifting</a:t>
+              <a:t>Most Assumptions were due to time constraints</a:t>
             </a:r>
           </a:p>
         </p:txBody>
@@ -1080,7 +1254,13 @@
           <a:p>
             <a:r>
               <a:rPr lang="en-US" dirty="0"/>
-              <a:t>https://www.craftbrewingbusiness.com/featured/understand-age-changing-demographics-craft-beer-drinkers-market-properly/</a:t>
+              <a:t>Opacity in plots to also show Brewery density</a:t>
+            </a:r>
+          </a:p>
+          <a:p>
+            <a:r>
+              <a:rPr lang="en-US" dirty="0"/>
+              <a:t>Also shows traditional brewery hotspots have redistributed</a:t>
             </a:r>
           </a:p>
           <a:p>
@@ -1089,8 +1269,13 @@
           <a:p>
             <a:r>
               <a:rPr lang="en-US" dirty="0"/>
-              <a:t>~ 70% are males</a:t>
-            </a:r>
+              <a:t>Made on </a:t>
+            </a:r>
+            <a:r>
+              <a:rPr lang="en-US" dirty="0" err="1"/>
+              <a:t>plotly</a:t>
+            </a:r>
+            <a:endParaRPr lang="en-US" dirty="0"/>
           </a:p>
         </p:txBody>
       </p:sp>
@@ -1111,7 +1296,7 @@
           <a:p>
             <a:fld id="{DD17A8D9-0DD1-40AC-9104-F27D923DAB7C}" type="slidenum">
               <a:rPr lang="en-US" smtClean="0"/>
-              <a:t>7</a:t>
+              <a:t>6</a:t>
             </a:fld>
             <a:endParaRPr lang="en-US"/>
           </a:p>
@@ -1120,7 +1305,7 @@
     </p:spTree>
     <p:extLst>
       <p:ext uri="{BB962C8B-B14F-4D97-AF65-F5344CB8AC3E}">
-        <p14:creationId xmlns:p14="http://schemas.microsoft.com/office/powerpoint/2010/main" val="346838849"/>
+        <p14:creationId xmlns:p14="http://schemas.microsoft.com/office/powerpoint/2010/main" val="2663798077"/>
       </p:ext>
     </p:extLst>
   </p:cSld>
@@ -1176,19 +1361,16 @@
           <a:p>
             <a:r>
               <a:rPr lang="en-US" dirty="0"/>
-              <a:t>Able to generate a CSV file that could then use Python to analyze </a:t>
-            </a:r>
+              <a:t>https://www.craftbrewingbusiness.com/featured/understand-age-changing-demographics-craft-beer-drinkers-market-properly/</a:t>
+            </a:r>
+          </a:p>
+          <a:p>
+            <a:endParaRPr lang="en-US" dirty="0"/>
           </a:p>
           <a:p>
             <a:r>
               <a:rPr lang="en-US" dirty="0"/>
-              <a:t>	- Little cleaning required mostly on header information. </a:t>
-            </a:r>
-          </a:p>
-          <a:p>
-            <a:r>
-              <a:rPr lang="en-US" dirty="0"/>
-              <a:t>Generated using Matplotlib</a:t>
+              <a:t>~ 70% are males</a:t>
             </a:r>
           </a:p>
         </p:txBody>
@@ -1210,7 +1392,7 @@
           <a:p>
             <a:fld id="{DD17A8D9-0DD1-40AC-9104-F27D923DAB7C}" type="slidenum">
               <a:rPr lang="en-US" smtClean="0"/>
-              <a:t>8</a:t>
+              <a:t>7</a:t>
             </a:fld>
             <a:endParaRPr lang="en-US"/>
           </a:p>
@@ -1219,7 +1401,7 @@
     </p:spTree>
     <p:extLst>
       <p:ext uri="{BB962C8B-B14F-4D97-AF65-F5344CB8AC3E}">
-        <p14:creationId xmlns:p14="http://schemas.microsoft.com/office/powerpoint/2010/main" val="1340638526"/>
+        <p14:creationId xmlns:p14="http://schemas.microsoft.com/office/powerpoint/2010/main" val="346838849"/>
       </p:ext>
     </p:extLst>
   </p:cSld>
@@ -1273,7 +1455,22 @@
           <a:bodyPr/>
           <a:lstStyle/>
           <a:p>
-            <a:endParaRPr lang="en-US" dirty="0"/>
+            <a:r>
+              <a:rPr lang="en-US" dirty="0"/>
+              <a:t>Able to generate a CSV file that could then use Python to analyze </a:t>
+            </a:r>
+          </a:p>
+          <a:p>
+            <a:r>
+              <a:rPr lang="en-US" dirty="0"/>
+              <a:t>	- Little cleaning required mostly on header information. </a:t>
+            </a:r>
+          </a:p>
+          <a:p>
+            <a:r>
+              <a:rPr lang="en-US" dirty="0"/>
+              <a:t>Generated using Matplotlib</a:t>
+            </a:r>
           </a:p>
         </p:txBody>
       </p:sp>
@@ -1294,7 +1491,7 @@
           <a:p>
             <a:fld id="{DD17A8D9-0DD1-40AC-9104-F27D923DAB7C}" type="slidenum">
               <a:rPr lang="en-US" smtClean="0"/>
-              <a:t>9</a:t>
+              <a:t>8</a:t>
             </a:fld>
             <a:endParaRPr lang="en-US"/>
           </a:p>
@@ -1303,7 +1500,7 @@
     </p:spTree>
     <p:extLst>
       <p:ext uri="{BB962C8B-B14F-4D97-AF65-F5344CB8AC3E}">
-        <p14:creationId xmlns:p14="http://schemas.microsoft.com/office/powerpoint/2010/main" val="1798559715"/>
+        <p14:creationId xmlns:p14="http://schemas.microsoft.com/office/powerpoint/2010/main" val="1340638526"/>
       </p:ext>
     </p:extLst>
   </p:cSld>
@@ -1357,58 +1554,7 @@
           <a:bodyPr/>
           <a:lstStyle/>
           <a:p>
-            <a:pPr marL="0" marR="0" lvl="0" indent="0" algn="l" defTabSz="914400" rtl="0" eaLnBrk="1" fontAlgn="auto" latinLnBrk="0" hangingPunct="1">
-              <a:lnSpc>
-                <a:spcPct val="100000"/>
-              </a:lnSpc>
-              <a:spcBef>
-                <a:spcPts val="0"/>
-              </a:spcBef>
-              <a:spcAft>
-                <a:spcPts val="0"/>
-              </a:spcAft>
-              <a:buClrTx/>
-              <a:buSzTx/>
-              <a:buFontTx/>
-              <a:buNone/>
-              <a:tabLst/>
-              <a:defRPr/>
-            </a:pPr>
-            <a:r>
-              <a:rPr lang="en-US" dirty="0"/>
-              <a:t>Harris county is 8</a:t>
-            </a:r>
-            <a:r>
-              <a:rPr lang="en-US" baseline="30000" dirty="0"/>
-              <a:t>th</a:t>
-            </a:r>
-            <a:r>
-              <a:rPr lang="en-US" dirty="0"/>
-              <a:t> in income </a:t>
-            </a:r>
-          </a:p>
-          <a:p>
-            <a:r>
-              <a:rPr lang="en-US" dirty="0"/>
-              <a:t>Bexar county 14</a:t>
-            </a:r>
-            <a:r>
-              <a:rPr lang="en-US" baseline="30000" dirty="0"/>
-              <a:t>th</a:t>
-            </a:r>
-            <a:r>
-              <a:rPr lang="en-US" dirty="0"/>
-              <a:t> in income </a:t>
-            </a:r>
-          </a:p>
-          <a:p>
             <a:endParaRPr lang="en-US" dirty="0"/>
-          </a:p>
-          <a:p>
-            <a:r>
-              <a:rPr lang="en-US" dirty="0"/>
-              <a:t>US Census report~ $60,000 US average</a:t>
-            </a:r>
           </a:p>
         </p:txBody>
       </p:sp>
@@ -1429,7 +1575,7 @@
           <a:p>
             <a:fld id="{DD17A8D9-0DD1-40AC-9104-F27D923DAB7C}" type="slidenum">
               <a:rPr lang="en-US" smtClean="0"/>
-              <a:t>10</a:t>
+              <a:t>9</a:t>
             </a:fld>
             <a:endParaRPr lang="en-US"/>
           </a:p>
@@ -1438,7 +1584,7 @@
     </p:spTree>
     <p:extLst>
       <p:ext uri="{BB962C8B-B14F-4D97-AF65-F5344CB8AC3E}">
-        <p14:creationId xmlns:p14="http://schemas.microsoft.com/office/powerpoint/2010/main" val="2220597440"/>
+        <p14:creationId xmlns:p14="http://schemas.microsoft.com/office/powerpoint/2010/main" val="1798559715"/>
       </p:ext>
     </p:extLst>
   </p:cSld>
@@ -1492,9 +1638,57 @@
           <a:bodyPr/>
           <a:lstStyle/>
           <a:p>
+            <a:pPr marL="0" marR="0" lvl="0" indent="0" algn="l" defTabSz="914400" rtl="0" eaLnBrk="1" fontAlgn="auto" latinLnBrk="0" hangingPunct="1">
+              <a:lnSpc>
+                <a:spcPct val="100000"/>
+              </a:lnSpc>
+              <a:spcBef>
+                <a:spcPts val="0"/>
+              </a:spcBef>
+              <a:spcAft>
+                <a:spcPts val="0"/>
+              </a:spcAft>
+              <a:buClrTx/>
+              <a:buSzTx/>
+              <a:buFontTx/>
+              <a:buNone/>
+              <a:tabLst/>
+              <a:defRPr/>
+            </a:pPr>
             <a:r>
               <a:rPr lang="en-US" dirty="0"/>
-              <a:t>Houston city is located in the center of Harris County</a:t>
+              <a:t>Harris county is 8</a:t>
+            </a:r>
+            <a:r>
+              <a:rPr lang="en-US" baseline="30000" dirty="0"/>
+              <a:t>th</a:t>
+            </a:r>
+            <a:r>
+              <a:rPr lang="en-US" dirty="0"/>
+              <a:t> in income </a:t>
+            </a:r>
+          </a:p>
+          <a:p>
+            <a:r>
+              <a:rPr lang="en-US" dirty="0"/>
+              <a:t>Bexar county 14</a:t>
+            </a:r>
+            <a:r>
+              <a:rPr lang="en-US" baseline="30000" dirty="0"/>
+              <a:t>th</a:t>
+            </a:r>
+            <a:r>
+              <a:rPr lang="en-US" dirty="0"/>
+              <a:t> in income </a:t>
+            </a:r>
+          </a:p>
+          <a:p>
+            <a:endParaRPr lang="en-US" dirty="0"/>
+          </a:p>
+          <a:p>
+            <a:r>
+              <a:rPr lang="en-US" dirty="0"/>
+              <a:t>US Census report~ $60,000 US average</a:t>
             </a:r>
           </a:p>
         </p:txBody>
@@ -1516,7 +1710,7 @@
           <a:p>
             <a:fld id="{DD17A8D9-0DD1-40AC-9104-F27D923DAB7C}" type="slidenum">
               <a:rPr lang="en-US" smtClean="0"/>
-              <a:t>11</a:t>
+              <a:t>10</a:t>
             </a:fld>
             <a:endParaRPr lang="en-US"/>
           </a:p>
@@ -1525,7 +1719,7 @@
     </p:spTree>
     <p:extLst>
       <p:ext uri="{BB962C8B-B14F-4D97-AF65-F5344CB8AC3E}">
-        <p14:creationId xmlns:p14="http://schemas.microsoft.com/office/powerpoint/2010/main" val="3300451721"/>
+        <p14:creationId xmlns:p14="http://schemas.microsoft.com/office/powerpoint/2010/main" val="2220597440"/>
       </p:ext>
     </p:extLst>
   </p:cSld>
@@ -1581,7 +1775,7 @@
           <a:p>
             <a:r>
               <a:rPr lang="en-US" dirty="0"/>
-              <a:t>Could describe here how we zoomed in on the locations to see where each of the breweries and grocery stores are located at. </a:t>
+              <a:t>Houston city is located in the center of Harris County</a:t>
             </a:r>
           </a:p>
         </p:txBody>
@@ -1603,7 +1797,7 @@
           <a:p>
             <a:fld id="{DD17A8D9-0DD1-40AC-9104-F27D923DAB7C}" type="slidenum">
               <a:rPr lang="en-US" smtClean="0"/>
-              <a:t>13</a:t>
+              <a:t>11</a:t>
             </a:fld>
             <a:endParaRPr lang="en-US"/>
           </a:p>
@@ -1612,7 +1806,7 @@
     </p:spTree>
     <p:extLst>
       <p:ext uri="{BB962C8B-B14F-4D97-AF65-F5344CB8AC3E}">
-        <p14:creationId xmlns:p14="http://schemas.microsoft.com/office/powerpoint/2010/main" val="809993758"/>
+        <p14:creationId xmlns:p14="http://schemas.microsoft.com/office/powerpoint/2010/main" val="3300451721"/>
       </p:ext>
     </p:extLst>
   </p:cSld>
@@ -10071,7 +10265,7 @@
     <p:bg>
       <p:bgPr>
         <a:blipFill dpi="0" rotWithShape="1">
-          <a:blip r:embed="rId2">
+          <a:blip r:embed="rId3">
             <a:lum/>
           </a:blip>
           <a:srcRect/>
@@ -11560,10 +11754,60 @@
           <a:chExt cx="0" cy="0"/>
         </a:xfrm>
       </p:grpSpPr>
+      <p:sp>
+        <p:nvSpPr>
+          <p:cNvPr id="2" name="Title 1">
+            <a:extLst>
+              <a:ext uri="{FF2B5EF4-FFF2-40B4-BE49-F238E27FC236}">
+                <a16:creationId xmlns:a16="http://schemas.microsoft.com/office/drawing/2014/main" id="{77EE3CE4-497A-4614-A888-C6F8145DEF34}"/>
+              </a:ext>
+            </a:extLst>
+          </p:cNvPr>
+          <p:cNvSpPr>
+            <a:spLocks noGrp="1"/>
+          </p:cNvSpPr>
+          <p:nvPr>
+            <p:ph type="ctrTitle"/>
+          </p:nvPr>
+        </p:nvSpPr>
+        <p:spPr>
+          <a:xfrm>
+            <a:off x="3968885" y="1867710"/>
+            <a:ext cx="4740613" cy="3122579"/>
+          </a:xfrm>
+        </p:spPr>
+        <p:txBody>
+          <a:bodyPr>
+            <a:normAutofit fontScale="90000"/>
+          </a:bodyPr>
+          <a:lstStyle/>
+          <a:p>
+            <a:pPr algn="ctr"/>
+            <a:r>
+              <a:rPr lang="en-US" sz="7200" dirty="0"/>
+              <a:t>Question</a:t>
+            </a:r>
+            <a:br>
+              <a:rPr lang="en-US" sz="7200" dirty="0"/>
+            </a:br>
+            <a:r>
+              <a:rPr lang="en-US" sz="7200" dirty="0"/>
+              <a:t>and</a:t>
+            </a:r>
+            <a:br>
+              <a:rPr lang="en-US" sz="7200" dirty="0"/>
+            </a:br>
+            <a:r>
+              <a:rPr lang="en-US" sz="7200" dirty="0"/>
+              <a:t>Answer</a:t>
+            </a:r>
+          </a:p>
+        </p:txBody>
+      </p:sp>
     </p:spTree>
     <p:extLst>
       <p:ext uri="{BB962C8B-B14F-4D97-AF65-F5344CB8AC3E}">
-        <p14:creationId xmlns:p14="http://schemas.microsoft.com/office/powerpoint/2010/main" val="3368907221"/>
+        <p14:creationId xmlns:p14="http://schemas.microsoft.com/office/powerpoint/2010/main" val="974771185"/>
       </p:ext>
     </p:extLst>
   </p:cSld>
@@ -14008,8 +14252,8 @@
         </p:nvSpPr>
         <p:spPr>
           <a:xfrm>
-            <a:off x="1363579" y="1280889"/>
-            <a:ext cx="9577137" cy="4991574"/>
+            <a:off x="1363579" y="1280888"/>
+            <a:ext cx="9577137" cy="5216165"/>
           </a:xfrm>
         </p:spPr>
         <p:txBody>
@@ -14084,6 +14328,12 @@
             <a:r>
               <a:rPr lang="en-US" sz="2000" dirty="0"/>
               <a:t>Used Census estimated population statistics from 2016</a:t>
+            </a:r>
+          </a:p>
+          <a:p>
+            <a:r>
+              <a:rPr lang="en-US" sz="2000" dirty="0"/>
+              <a:t>Would have been $500 for membership, or two week request to get data from Brewers Association.  Had to go forward with their findings</a:t>
             </a:r>
           </a:p>
           <a:p>
@@ -14134,7 +14384,7 @@
     <p:bg>
       <p:bgPr>
         <a:blipFill dpi="0" rotWithShape="1">
-          <a:blip r:embed="rId2">
+          <a:blip r:embed="rId3">
             <a:lum/>
           </a:blip>
           <a:srcRect/>

</xml_diff>